<commit_message>
presentations from ornl workshop
</commit_message>
<xml_diff>
--- a/documents/Overview of BioLUC Inman may 7.pptx
+++ b/documents/Overview of BioLUC Inman may 7.pptx
@@ -205,7 +205,7 @@
             <a:fld id="{62430CC7-8C13-4D51-BC46-B95A4AC4A04B}" type="datetimeFigureOut">
               <a:rPr lang="en-US" smtClean="0"/>
               <a:pPr/>
-              <a:t>5/6/13</a:t>
+              <a:t>5/7/13</a:t>
             </a:fld>
             <a:endParaRPr lang="en-US"/>
           </a:p>
@@ -4988,6 +4988,13 @@
   <p:transition xmlns:p14="http://schemas.microsoft.com/office/powerpoint/2010/main">
     <p:fade thruBlk="1"/>
   </p:transition>
+  <p:timing>
+    <p:tnLst>
+      <p:par>
+        <p:cTn xmlns:p14="http://schemas.microsoft.com/office/powerpoint/2010/main" id="1" dur="indefinite" restart="never" nodeType="tmRoot"/>
+      </p:par>
+    </p:tnLst>
+  </p:timing>
 </p:sld>
 </file>
 
@@ -5073,6 +5080,13 @@
   <p:transition xmlns:p14="http://schemas.microsoft.com/office/powerpoint/2010/main">
     <p:fade/>
   </p:transition>
+  <p:timing>
+    <p:tnLst>
+      <p:par>
+        <p:cTn xmlns:p14="http://schemas.microsoft.com/office/powerpoint/2010/main" id="1" dur="indefinite" restart="never" nodeType="tmRoot"/>
+      </p:par>
+    </p:tnLst>
+  </p:timing>
 </p:sld>
 </file>
 

</xml_diff>